<commit_message>
Deploying to gh-pages from @ sspaink/ReleaseGoPresentation@211c7b72db21f2d34b683109fde373fd27b0f652 🚀
</commit_message>
<xml_diff>
--- a/README.pptx
+++ b/README.pptx
@@ -593,7 +593,8 @@
           <a:p>
             <a:r>
               <a:rPr lang="en-US" dirty="0"/>
-              <a:t>_style: lead invert</a:t>
+              <a:t>This is a presenter note for this page.
+EXAMPLE: An EXAMPLE directive is not defined in Marp/Marpit, so this works as presenter notes.</a:t>
             </a:r>
             <a:endParaRPr lang="en-US" dirty="0"/>
           </a:p>
@@ -681,8 +682,7 @@
           <a:p>
             <a:r>
               <a:rPr lang="en-US" dirty="0"/>
-              <a:t>This is a presenter note for this page.
-EXAMPLE: An EXAMPLE directive is not defined in Marp/Marpit, so this works as presenter notes.</a:t>
+              <a:t/>
             </a:r>
             <a:endParaRPr lang="en-US" dirty="0"/>
           </a:p>

</xml_diff>